<commit_message>
new z posterior heat map figure. broke the example figure into two separate figs. - fig 1: comparing Z to Y - fig 2: Z post heat map, with posterior distribs of metacom metrics/structures
</commit_message>
<xml_diff>
--- a/Tables_Figures/Example1/Example1_Fig.pptx
+++ b/Tables_Figures/Example1/Example1_Fig.pptx
@@ -5,10 +5,11 @@
     <p:sldMasterId id="2147483648" r:id="rId1"/>
   </p:sldMasterIdLst>
   <p:notesMasterIdLst>
-    <p:notesMasterId r:id="rId3"/>
+    <p:notesMasterId r:id="rId4"/>
   </p:notesMasterIdLst>
   <p:sldIdLst>
     <p:sldId id="257" r:id="rId2"/>
+    <p:sldId id="258" r:id="rId3"/>
   </p:sldIdLst>
   <p:sldSz cx="13716000" cy="6858000"/>
   <p:notesSz cx="6858000" cy="9144000"/>
@@ -192,7 +193,7 @@
           <a:p>
             <a:fld id="{54BF691E-C928-604F-BA58-BB42F68C449A}" type="datetimeFigureOut">
               <a:rPr lang="en-US" smtClean="0"/>
-              <a:t>3/25/14</a:t>
+              <a:t>5/9/14</a:t>
             </a:fld>
             <a:endParaRPr lang="en-US"/>
           </a:p>
@@ -725,7 +726,7 @@
           <a:p>
             <a:fld id="{70CA730B-F521-A54B-BECF-B78963336071}" type="datetimeFigureOut">
               <a:rPr lang="en-US" smtClean="0"/>
-              <a:t>3/25/14</a:t>
+              <a:t>5/9/14</a:t>
             </a:fld>
             <a:endParaRPr lang="en-US"/>
           </a:p>
@@ -895,7 +896,7 @@
           <a:p>
             <a:fld id="{70CA730B-F521-A54B-BECF-B78963336071}" type="datetimeFigureOut">
               <a:rPr lang="en-US" smtClean="0"/>
-              <a:t>3/25/14</a:t>
+              <a:t>5/9/14</a:t>
             </a:fld>
             <a:endParaRPr lang="en-US"/>
           </a:p>
@@ -1075,7 +1076,7 @@
           <a:p>
             <a:fld id="{70CA730B-F521-A54B-BECF-B78963336071}" type="datetimeFigureOut">
               <a:rPr lang="en-US" smtClean="0"/>
-              <a:t>3/25/14</a:t>
+              <a:t>5/9/14</a:t>
             </a:fld>
             <a:endParaRPr lang="en-US"/>
           </a:p>
@@ -1245,7 +1246,7 @@
           <a:p>
             <a:fld id="{70CA730B-F521-A54B-BECF-B78963336071}" type="datetimeFigureOut">
               <a:rPr lang="en-US" smtClean="0"/>
-              <a:t>3/25/14</a:t>
+              <a:t>5/9/14</a:t>
             </a:fld>
             <a:endParaRPr lang="en-US"/>
           </a:p>
@@ -1491,7 +1492,7 @@
           <a:p>
             <a:fld id="{70CA730B-F521-A54B-BECF-B78963336071}" type="datetimeFigureOut">
               <a:rPr lang="en-US" smtClean="0"/>
-              <a:t>3/25/14</a:t>
+              <a:t>5/9/14</a:t>
             </a:fld>
             <a:endParaRPr lang="en-US"/>
           </a:p>
@@ -1779,7 +1780,7 @@
           <a:p>
             <a:fld id="{70CA730B-F521-A54B-BECF-B78963336071}" type="datetimeFigureOut">
               <a:rPr lang="en-US" smtClean="0"/>
-              <a:t>3/25/14</a:t>
+              <a:t>5/9/14</a:t>
             </a:fld>
             <a:endParaRPr lang="en-US"/>
           </a:p>
@@ -2201,7 +2202,7 @@
           <a:p>
             <a:fld id="{70CA730B-F521-A54B-BECF-B78963336071}" type="datetimeFigureOut">
               <a:rPr lang="en-US" smtClean="0"/>
-              <a:t>3/25/14</a:t>
+              <a:t>5/9/14</a:t>
             </a:fld>
             <a:endParaRPr lang="en-US"/>
           </a:p>
@@ -2319,7 +2320,7 @@
           <a:p>
             <a:fld id="{70CA730B-F521-A54B-BECF-B78963336071}" type="datetimeFigureOut">
               <a:rPr lang="en-US" smtClean="0"/>
-              <a:t>3/25/14</a:t>
+              <a:t>5/9/14</a:t>
             </a:fld>
             <a:endParaRPr lang="en-US"/>
           </a:p>
@@ -2414,7 +2415,7 @@
           <a:p>
             <a:fld id="{70CA730B-F521-A54B-BECF-B78963336071}" type="datetimeFigureOut">
               <a:rPr lang="en-US" smtClean="0"/>
-              <a:t>3/25/14</a:t>
+              <a:t>5/9/14</a:t>
             </a:fld>
             <a:endParaRPr lang="en-US"/>
           </a:p>
@@ -2691,7 +2692,7 @@
           <a:p>
             <a:fld id="{70CA730B-F521-A54B-BECF-B78963336071}" type="datetimeFigureOut">
               <a:rPr lang="en-US" smtClean="0"/>
-              <a:t>3/25/14</a:t>
+              <a:t>5/9/14</a:t>
             </a:fld>
             <a:endParaRPr lang="en-US"/>
           </a:p>
@@ -2944,7 +2945,7 @@
           <a:p>
             <a:fld id="{70CA730B-F521-A54B-BECF-B78963336071}" type="datetimeFigureOut">
               <a:rPr lang="en-US" smtClean="0"/>
-              <a:t>3/25/14</a:t>
+              <a:t>5/9/14</a:t>
             </a:fld>
             <a:endParaRPr lang="en-US"/>
           </a:p>
@@ -3157,7 +3158,7 @@
           <a:p>
             <a:fld id="{70CA730B-F521-A54B-BECF-B78963336071}" type="datetimeFigureOut">
               <a:rPr lang="en-US" smtClean="0"/>
-              <a:t>3/25/14</a:t>
+              <a:t>5/9/14</a:t>
             </a:fld>
             <a:endParaRPr lang="en-US"/>
           </a:p>
@@ -3534,34 +3535,34 @@
       </p:grpSpPr>
       <p:grpSp>
         <p:nvGrpSpPr>
-          <p:cNvPr id="29" name="Group 28"/>
+          <p:cNvPr id="32" name="Group 31"/>
           <p:cNvGrpSpPr/>
           <p:nvPr/>
         </p:nvGrpSpPr>
         <p:grpSpPr>
           <a:xfrm>
-            <a:off x="-144322" y="0"/>
-            <a:ext cx="14172418" cy="6277180"/>
-            <a:chOff x="-144322" y="0"/>
-            <a:chExt cx="14172418" cy="6277180"/>
+            <a:off x="911412" y="134471"/>
+            <a:ext cx="11579412" cy="5752353"/>
+            <a:chOff x="911412" y="134471"/>
+            <a:chExt cx="11579412" cy="5752353"/>
           </a:xfrm>
         </p:grpSpPr>
         <p:sp>
           <p:nvSpPr>
-            <p:cNvPr id="28" name="Rectangle 27"/>
+            <p:cNvPr id="31" name="Rectangle 30"/>
             <p:cNvSpPr/>
             <p:nvPr/>
           </p:nvSpPr>
           <p:spPr>
             <a:xfrm>
-              <a:off x="-144322" y="0"/>
-              <a:ext cx="14172418" cy="6277180"/>
+              <a:off x="911412" y="134471"/>
+              <a:ext cx="11579412" cy="5752353"/>
             </a:xfrm>
             <a:prstGeom prst="rect">
               <a:avLst/>
             </a:prstGeom>
             <a:solidFill>
-              <a:schemeClr val="bg1"/>
+              <a:srgbClr val="FFFFFF"/>
             </a:solidFill>
             <a:ln>
               <a:noFill/>
@@ -3593,21 +3594,21 @@
         </p:sp>
         <p:grpSp>
           <p:nvGrpSpPr>
-            <p:cNvPr id="26" name="Group 25"/>
+            <p:cNvPr id="30" name="Group 29"/>
             <p:cNvGrpSpPr/>
             <p:nvPr/>
           </p:nvGrpSpPr>
           <p:grpSpPr>
             <a:xfrm>
-              <a:off x="0" y="108588"/>
-              <a:ext cx="13898196" cy="6040398"/>
-              <a:chOff x="0" y="108588"/>
-              <a:chExt cx="13898196" cy="6040398"/>
+              <a:off x="1049476" y="272939"/>
+              <a:ext cx="11324720" cy="5486400"/>
+              <a:chOff x="1049476" y="108588"/>
+              <a:chExt cx="11324720" cy="5486400"/>
             </a:xfrm>
           </p:grpSpPr>
           <p:pic>
             <p:nvPicPr>
-              <p:cNvPr id="2" name="Picture 1" descr="Zmat_ord.pdf"/>
+              <p:cNvPr id="27" name="Picture 26" descr="Zpost_ord.pdf"/>
               <p:cNvPicPr>
                 <a:picLocks noChangeAspect="1"/>
               </p:cNvPicPr>
@@ -3627,37 +3628,7 @@
             </p:blipFill>
             <p:spPr>
               <a:xfrm>
-                <a:off x="0" y="108588"/>
-                <a:ext cx="2743200" cy="5486400"/>
-              </a:xfrm>
-              <a:prstGeom prst="rect">
-                <a:avLst/>
-              </a:prstGeom>
-            </p:spPr>
-          </p:pic>
-          <p:pic>
-            <p:nvPicPr>
-              <p:cNvPr id="3" name="Picture 2" descr="Ymat_ord.pdf"/>
-              <p:cNvPicPr>
-                <a:picLocks noChangeAspect="1"/>
-              </p:cNvPicPr>
-              <p:nvPr/>
-            </p:nvPicPr>
-            <p:blipFill>
-              <a:blip r:embed="rId4">
-                <a:extLst>
-                  <a:ext uri="{28A0092B-C50C-407E-A947-70E740481C1C}">
-                    <a14:useLocalDpi xmlns:a14="http://schemas.microsoft.com/office/drawing/2010/main" val="0"/>
-                  </a:ext>
-                </a:extLst>
-              </a:blip>
-              <a:stretch>
-                <a:fillRect/>
-              </a:stretch>
-            </p:blipFill>
-            <p:spPr>
-              <a:xfrm>
-                <a:off x="2570016" y="108588"/>
+                <a:off x="1049476" y="108588"/>
                 <a:ext cx="2743200" cy="5486400"/>
               </a:xfrm>
               <a:prstGeom prst="rect">
@@ -3667,13 +3638,13 @@
           </p:pic>
           <p:sp>
             <p:nvSpPr>
-              <p:cNvPr id="9" name="TextBox 8"/>
+              <p:cNvPr id="10" name="TextBox 9"/>
               <p:cNvSpPr txBox="1"/>
               <p:nvPr/>
             </p:nvSpPr>
             <p:spPr>
               <a:xfrm rot="16200000">
-                <a:off x="-132130" y="2476253"/>
+                <a:off x="917345" y="2476253"/>
                 <a:ext cx="633594" cy="369332"/>
               </a:xfrm>
               <a:prstGeom prst="rect">
@@ -3703,50 +3674,14 @@
           </p:sp>
           <p:sp>
             <p:nvSpPr>
-              <p:cNvPr id="10" name="TextBox 9"/>
-              <p:cNvSpPr txBox="1"/>
-              <p:nvPr/>
-            </p:nvSpPr>
-            <p:spPr>
-              <a:xfrm rot="16200000">
-                <a:off x="2441345" y="2476253"/>
-                <a:ext cx="633594" cy="369332"/>
-              </a:xfrm>
-              <a:prstGeom prst="rect">
-                <a:avLst/>
-              </a:prstGeom>
-              <a:noFill/>
-            </p:spPr>
-            <p:txBody>
-              <a:bodyPr wrap="none" rtlCol="0">
-                <a:spAutoFit/>
-              </a:bodyPr>
-              <a:lstStyle/>
-              <a:p>
-                <a:r>
-                  <a:rPr lang="en-US" dirty="0" smtClean="0">
-                    <a:latin typeface="Times"/>
-                    <a:cs typeface="Times"/>
-                  </a:rPr>
-                  <a:t>Sites</a:t>
-                </a:r>
-                <a:endParaRPr lang="en-US" dirty="0">
-                  <a:latin typeface="Times"/>
-                  <a:cs typeface="Times"/>
-                </a:endParaRPr>
-              </a:p>
-            </p:txBody>
-          </p:sp>
-          <p:sp>
-            <p:nvSpPr>
-              <p:cNvPr id="11" name="TextBox 10"/>
+              <p:cNvPr id="12" name="TextBox 11"/>
               <p:cNvSpPr txBox="1"/>
               <p:nvPr/>
             </p:nvSpPr>
             <p:spPr>
               <a:xfrm>
-                <a:off x="941294" y="5225656"/>
-                <a:ext cx="889787" cy="923330"/>
+                <a:off x="1986557" y="5225656"/>
+                <a:ext cx="889787" cy="369332"/>
               </a:xfrm>
               <a:prstGeom prst="rect">
                 <a:avLst/>
@@ -3767,37 +3702,7 @@
                   </a:rPr>
                   <a:t>Species</a:t>
                 </a:r>
-              </a:p>
-              <a:p>
-                <a:pPr algn="ctr"/>
-                <a:r>
-                  <a:rPr lang="en-US" dirty="0" smtClean="0">
-                    <a:latin typeface="Times"/>
-                    <a:cs typeface="Times"/>
-                  </a:rPr>
-                  <a:t>(</a:t>
-                </a:r>
-                <a:r>
-                  <a:rPr lang="en-US" i="1" dirty="0" smtClean="0">
-                    <a:latin typeface="Times"/>
-                    <a:cs typeface="Times"/>
-                  </a:rPr>
-                  <a:t>Z</a:t>
-                </a:r>
-                <a:r>
-                  <a:rPr lang="en-US" dirty="0" smtClean="0">
-                    <a:latin typeface="Times"/>
-                    <a:cs typeface="Times"/>
-                  </a:rPr>
-                  <a:t>)</a:t>
-                </a:r>
                 <a:endParaRPr lang="en-US" dirty="0" smtClean="0">
-                  <a:latin typeface="Times"/>
-                  <a:cs typeface="Times"/>
-                </a:endParaRPr>
-              </a:p>
-              <a:p>
-                <a:endParaRPr lang="en-US" dirty="0">
                   <a:latin typeface="Times"/>
                   <a:cs typeface="Times"/>
                 </a:endParaRPr>
@@ -3806,74 +3711,13 @@
           </p:sp>
           <p:sp>
             <p:nvSpPr>
-              <p:cNvPr id="12" name="TextBox 11"/>
+              <p:cNvPr id="19" name="TextBox 18"/>
               <p:cNvSpPr txBox="1"/>
               <p:nvPr/>
             </p:nvSpPr>
             <p:spPr>
               <a:xfrm>
-                <a:off x="3510557" y="5225656"/>
-                <a:ext cx="889787" cy="646331"/>
-              </a:xfrm>
-              <a:prstGeom prst="rect">
-                <a:avLst/>
-              </a:prstGeom>
-              <a:noFill/>
-            </p:spPr>
-            <p:txBody>
-              <a:bodyPr wrap="none" rtlCol="0">
-                <a:spAutoFit/>
-              </a:bodyPr>
-              <a:lstStyle/>
-              <a:p>
-                <a:pPr algn="ctr"/>
-                <a:r>
-                  <a:rPr lang="en-US" dirty="0" smtClean="0">
-                    <a:latin typeface="Times"/>
-                    <a:cs typeface="Times"/>
-                  </a:rPr>
-                  <a:t>Species</a:t>
-                </a:r>
-              </a:p>
-              <a:p>
-                <a:pPr algn="ctr"/>
-                <a:r>
-                  <a:rPr lang="en-US" dirty="0" smtClean="0">
-                    <a:latin typeface="Times"/>
-                    <a:cs typeface="Times"/>
-                  </a:rPr>
-                  <a:t>(</a:t>
-                </a:r>
-                <a:r>
-                  <a:rPr lang="en-US" i="1" dirty="0" smtClean="0">
-                    <a:latin typeface="Times"/>
-                    <a:cs typeface="Times"/>
-                  </a:rPr>
-                  <a:t>Y</a:t>
-                </a:r>
-                <a:r>
-                  <a:rPr lang="en-US" dirty="0" smtClean="0">
-                    <a:latin typeface="Times"/>
-                    <a:cs typeface="Times"/>
-                  </a:rPr>
-                  <a:t>)</a:t>
-                </a:r>
-                <a:endParaRPr lang="en-US" dirty="0">
-                  <a:latin typeface="Times"/>
-                  <a:cs typeface="Times"/>
-                </a:endParaRPr>
-              </a:p>
-            </p:txBody>
-          </p:sp>
-          <p:sp>
-            <p:nvSpPr>
-              <p:cNvPr id="18" name="TextBox 17"/>
-              <p:cNvSpPr txBox="1"/>
-              <p:nvPr/>
-            </p:nvSpPr>
-            <p:spPr>
-              <a:xfrm>
-                <a:off x="444038" y="298129"/>
+                <a:off x="1507850" y="178601"/>
                 <a:ext cx="440858" cy="369332"/>
               </a:xfrm>
               <a:prstGeom prst="rect">
@@ -3901,42 +3745,6 @@
               </a:p>
             </p:txBody>
           </p:sp>
-          <p:sp>
-            <p:nvSpPr>
-              <p:cNvPr id="19" name="TextBox 18"/>
-              <p:cNvSpPr txBox="1"/>
-              <p:nvPr/>
-            </p:nvSpPr>
-            <p:spPr>
-              <a:xfrm>
-                <a:off x="3031850" y="298129"/>
-                <a:ext cx="453820" cy="369332"/>
-              </a:xfrm>
-              <a:prstGeom prst="rect">
-                <a:avLst/>
-              </a:prstGeom>
-              <a:noFill/>
-            </p:spPr>
-            <p:txBody>
-              <a:bodyPr wrap="none" rtlCol="0">
-                <a:spAutoFit/>
-              </a:bodyPr>
-              <a:lstStyle/>
-              <a:p>
-                <a:r>
-                  <a:rPr lang="en-US" dirty="0" smtClean="0">
-                    <a:latin typeface="Times"/>
-                    <a:cs typeface="Times"/>
-                  </a:rPr>
-                  <a:t>(b)</a:t>
-                </a:r>
-                <a:endParaRPr lang="en-US" dirty="0">
-                  <a:latin typeface="Times"/>
-                  <a:cs typeface="Times"/>
-                </a:endParaRPr>
-              </a:p>
-            </p:txBody>
-          </p:sp>
           <p:grpSp>
             <p:nvGrpSpPr>
               <p:cNvPr id="24" name="Group 23"/>
@@ -3945,7 +3753,7 @@
             </p:nvGrpSpPr>
             <p:grpSpPr>
               <a:xfrm>
-                <a:off x="5411327" y="108588"/>
+                <a:off x="3887327" y="108588"/>
                 <a:ext cx="8486869" cy="3024934"/>
                 <a:chOff x="5411327" y="108588"/>
                 <a:chExt cx="8486869" cy="3024934"/>
@@ -3960,7 +3768,7 @@
                 <p:nvPr/>
               </p:nvPicPr>
               <p:blipFill>
-                <a:blip r:embed="rId5">
+                <a:blip r:embed="rId4">
                   <a:extLst>
                     <a:ext uri="{28A0092B-C50C-407E-A947-70E740481C1C}">
                       <a14:useLocalDpi xmlns:a14="http://schemas.microsoft.com/office/drawing/2010/main" val="0"/>
@@ -3990,7 +3798,7 @@
                 <p:nvPr/>
               </p:nvPicPr>
               <p:blipFill>
-                <a:blip r:embed="rId6">
+                <a:blip r:embed="rId5">
                   <a:extLst>
                     <a:ext uri="{28A0092B-C50C-407E-A947-70E740481C1C}">
                       <a14:useLocalDpi xmlns:a14="http://schemas.microsoft.com/office/drawing/2010/main" val="0"/>
@@ -4020,7 +3828,7 @@
                 <p:nvPr/>
               </p:nvPicPr>
               <p:blipFill>
-                <a:blip r:embed="rId7">
+                <a:blip r:embed="rId6">
                   <a:extLst>
                     <a:ext uri="{28A0092B-C50C-407E-A947-70E740481C1C}">
                       <a14:useLocalDpi xmlns:a14="http://schemas.microsoft.com/office/drawing/2010/main" val="0"/>
@@ -4200,7 +4008,43 @@
               </p:nvSpPr>
               <p:spPr>
                 <a:xfrm>
-                  <a:off x="6122637" y="298129"/>
+                  <a:off x="6122637" y="178601"/>
+                  <a:ext cx="453820" cy="369332"/>
+                </a:xfrm>
+                <a:prstGeom prst="rect">
+                  <a:avLst/>
+                </a:prstGeom>
+                <a:noFill/>
+              </p:spPr>
+              <p:txBody>
+                <a:bodyPr wrap="none" rtlCol="0">
+                  <a:spAutoFit/>
+                </a:bodyPr>
+                <a:lstStyle/>
+                <a:p>
+                  <a:r>
+                    <a:rPr lang="en-US" dirty="0" smtClean="0">
+                      <a:latin typeface="Times"/>
+                      <a:cs typeface="Times"/>
+                    </a:rPr>
+                    <a:t>(b)</a:t>
+                  </a:r>
+                  <a:endParaRPr lang="en-US" dirty="0">
+                    <a:latin typeface="Times"/>
+                    <a:cs typeface="Times"/>
+                  </a:endParaRPr>
+                </a:p>
+              </p:txBody>
+            </p:sp>
+            <p:sp>
+              <p:nvSpPr>
+                <p:cNvPr id="21" name="TextBox 20"/>
+                <p:cNvSpPr txBox="1"/>
+                <p:nvPr/>
+              </p:nvSpPr>
+              <p:spPr>
+                <a:xfrm>
+                  <a:off x="8780063" y="173709"/>
                   <a:ext cx="440858" cy="369332"/>
                 </a:xfrm>
                 <a:prstGeom prst="rect">
@@ -4230,13 +4074,13 @@
             </p:sp>
             <p:sp>
               <p:nvSpPr>
-                <p:cNvPr id="21" name="TextBox 20"/>
+                <p:cNvPr id="22" name="TextBox 21"/>
                 <p:cNvSpPr txBox="1"/>
                 <p:nvPr/>
               </p:nvSpPr>
               <p:spPr>
                 <a:xfrm>
-                  <a:off x="8780063" y="293237"/>
+                  <a:off x="11471642" y="173709"/>
                   <a:ext cx="453820" cy="369332"/>
                 </a:xfrm>
                 <a:prstGeom prst="rect">
@@ -4264,42 +4108,6 @@
                 </a:p>
               </p:txBody>
             </p:sp>
-            <p:sp>
-              <p:nvSpPr>
-                <p:cNvPr id="22" name="TextBox 21"/>
-                <p:cNvSpPr txBox="1"/>
-                <p:nvPr/>
-              </p:nvSpPr>
-              <p:spPr>
-                <a:xfrm>
-                  <a:off x="11471642" y="293237"/>
-                  <a:ext cx="440858" cy="369332"/>
-                </a:xfrm>
-                <a:prstGeom prst="rect">
-                  <a:avLst/>
-                </a:prstGeom>
-                <a:noFill/>
-              </p:spPr>
-              <p:txBody>
-                <a:bodyPr wrap="none" rtlCol="0">
-                  <a:spAutoFit/>
-                </a:bodyPr>
-                <a:lstStyle/>
-                <a:p>
-                  <a:r>
-                    <a:rPr lang="en-US" dirty="0" smtClean="0">
-                      <a:latin typeface="Times"/>
-                      <a:cs typeface="Times"/>
-                    </a:rPr>
-                    <a:t>(e)</a:t>
-                  </a:r>
-                  <a:endParaRPr lang="en-US" dirty="0">
-                    <a:latin typeface="Times"/>
-                    <a:cs typeface="Times"/>
-                  </a:endParaRPr>
-                </a:p>
-              </p:txBody>
-            </p:sp>
           </p:grpSp>
           <p:grpSp>
             <p:nvGrpSpPr>
@@ -4309,7 +4117,7 @@
             </p:nvGrpSpPr>
             <p:grpSpPr>
               <a:xfrm>
-                <a:off x="6095774" y="3343922"/>
+                <a:off x="4571774" y="3343922"/>
                 <a:ext cx="7249150" cy="2027849"/>
                 <a:chOff x="6228099" y="3851779"/>
                 <a:chExt cx="7249150" cy="2027849"/>
@@ -4324,7 +4132,7 @@
                 <p:nvPr/>
               </p:nvPicPr>
               <p:blipFill rotWithShape="1">
-                <a:blip r:embed="rId8">
+                <a:blip r:embed="rId7">
                   <a:extLst>
                     <a:ext uri="{28A0092B-C50C-407E-A947-70E740481C1C}">
                       <a14:useLocalDpi xmlns:a14="http://schemas.microsoft.com/office/drawing/2010/main" val="0"/>
@@ -4353,7 +4161,7 @@
                 <p:nvPr/>
               </p:nvPicPr>
               <p:blipFill rotWithShape="1">
-                <a:blip r:embed="rId8">
+                <a:blip r:embed="rId7">
                   <a:extLst>
                     <a:ext uri="{28A0092B-C50C-407E-A947-70E740481C1C}">
                       <a14:useLocalDpi xmlns:a14="http://schemas.microsoft.com/office/drawing/2010/main" val="0"/>
@@ -4418,7 +4226,7 @@
               <p:spPr>
                 <a:xfrm>
                   <a:off x="6297025" y="3872882"/>
-                  <a:ext cx="415273" cy="369332"/>
+                  <a:ext cx="440858" cy="369332"/>
                 </a:xfrm>
                 <a:prstGeom prst="rect">
                   <a:avLst/>
@@ -4436,7 +4244,7 @@
                       <a:latin typeface="Times"/>
                       <a:cs typeface="Times"/>
                     </a:rPr>
-                    <a:t>(f)</a:t>
+                    <a:t>(e)</a:t>
                   </a:r>
                   <a:endParaRPr lang="en-US" dirty="0">
                     <a:latin typeface="Times"/>
@@ -4452,6 +4260,437 @@
     <p:extLst>
       <p:ext uri="{BB962C8B-B14F-4D97-AF65-F5344CB8AC3E}">
         <p14:creationId xmlns:p14="http://schemas.microsoft.com/office/powerpoint/2010/main" val="1194401335"/>
+      </p:ext>
+    </p:extLst>
+  </p:cSld>
+  <p:clrMapOvr>
+    <a:masterClrMapping/>
+  </p:clrMapOvr>
+</p:sld>
+</file>
+
+<file path=ppt/slides/slide2.xml><?xml version="1.0" encoding="utf-8"?>
+<p:sld xmlns:a="http://schemas.openxmlformats.org/drawingml/2006/main" xmlns:r="http://schemas.openxmlformats.org/officeDocument/2006/relationships" xmlns:p="http://schemas.openxmlformats.org/presentationml/2006/main">
+  <p:cSld>
+    <p:spTree>
+      <p:nvGrpSpPr>
+        <p:cNvPr id="1" name=""/>
+        <p:cNvGrpSpPr/>
+        <p:nvPr/>
+      </p:nvGrpSpPr>
+      <p:grpSpPr>
+        <a:xfrm>
+          <a:off x="0" y="0"/>
+          <a:ext cx="0" cy="0"/>
+          <a:chOff x="0" y="0"/>
+          <a:chExt cx="0" cy="0"/>
+        </a:xfrm>
+      </p:grpSpPr>
+      <p:grpSp>
+        <p:nvGrpSpPr>
+          <p:cNvPr id="12" name="Group 11"/>
+          <p:cNvGrpSpPr/>
+          <p:nvPr/>
+        </p:nvGrpSpPr>
+        <p:grpSpPr>
+          <a:xfrm>
+            <a:off x="3839882" y="149412"/>
+            <a:ext cx="5602942" cy="6036235"/>
+            <a:chOff x="3839882" y="149412"/>
+            <a:chExt cx="5602942" cy="6036235"/>
+          </a:xfrm>
+        </p:grpSpPr>
+        <p:sp>
+          <p:nvSpPr>
+            <p:cNvPr id="11" name="Rectangle 10"/>
+            <p:cNvSpPr/>
+            <p:nvPr/>
+          </p:nvSpPr>
+          <p:spPr>
+            <a:xfrm>
+              <a:off x="3839882" y="149412"/>
+              <a:ext cx="5602942" cy="6036235"/>
+            </a:xfrm>
+            <a:prstGeom prst="rect">
+              <a:avLst/>
+            </a:prstGeom>
+            <a:solidFill>
+              <a:schemeClr val="bg1"/>
+            </a:solidFill>
+            <a:ln>
+              <a:noFill/>
+            </a:ln>
+            <a:effectLst/>
+          </p:spPr>
+          <p:style>
+            <a:lnRef idx="1">
+              <a:schemeClr val="accent1"/>
+            </a:lnRef>
+            <a:fillRef idx="3">
+              <a:schemeClr val="accent1"/>
+            </a:fillRef>
+            <a:effectRef idx="2">
+              <a:schemeClr val="accent1"/>
+            </a:effectRef>
+            <a:fontRef idx="minor">
+              <a:schemeClr val="lt1"/>
+            </a:fontRef>
+          </p:style>
+          <p:txBody>
+            <a:bodyPr rtlCol="0" anchor="ctr"/>
+            <a:lstStyle/>
+            <a:p>
+              <a:pPr algn="ctr"/>
+              <a:endParaRPr lang="en-US"/>
+            </a:p>
+          </p:txBody>
+        </p:sp>
+        <p:grpSp>
+          <p:nvGrpSpPr>
+            <p:cNvPr id="10" name="Group 9"/>
+            <p:cNvGrpSpPr/>
+            <p:nvPr/>
+          </p:nvGrpSpPr>
+          <p:grpSpPr>
+            <a:xfrm>
+              <a:off x="3989294" y="298129"/>
+              <a:ext cx="5313216" cy="5763399"/>
+              <a:chOff x="3989294" y="298129"/>
+              <a:chExt cx="5313216" cy="5763399"/>
+            </a:xfrm>
+          </p:grpSpPr>
+          <p:pic>
+            <p:nvPicPr>
+              <p:cNvPr id="2" name="Picture 1" descr="Zmat_ord.pdf"/>
+              <p:cNvPicPr>
+                <a:picLocks noChangeAspect="1"/>
+              </p:cNvPicPr>
+              <p:nvPr/>
+            </p:nvPicPr>
+            <p:blipFill>
+              <a:blip r:embed="rId2">
+                <a:extLst>
+                  <a:ext uri="{28A0092B-C50C-407E-A947-70E740481C1C}">
+                    <a14:useLocalDpi xmlns:a14="http://schemas.microsoft.com/office/drawing/2010/main" val="0"/>
+                  </a:ext>
+                </a:extLst>
+              </a:blip>
+              <a:stretch>
+                <a:fillRect/>
+              </a:stretch>
+            </p:blipFill>
+            <p:spPr>
+              <a:xfrm>
+                <a:off x="3989294" y="298129"/>
+                <a:ext cx="2743200" cy="5486400"/>
+              </a:xfrm>
+              <a:prstGeom prst="rect">
+                <a:avLst/>
+              </a:prstGeom>
+            </p:spPr>
+          </p:pic>
+          <p:pic>
+            <p:nvPicPr>
+              <p:cNvPr id="3" name="Picture 2" descr="Ymat_ord.pdf"/>
+              <p:cNvPicPr>
+                <a:picLocks noChangeAspect="1"/>
+              </p:cNvPicPr>
+              <p:nvPr/>
+            </p:nvPicPr>
+            <p:blipFill>
+              <a:blip r:embed="rId3">
+                <a:extLst>
+                  <a:ext uri="{28A0092B-C50C-407E-A947-70E740481C1C}">
+                    <a14:useLocalDpi xmlns:a14="http://schemas.microsoft.com/office/drawing/2010/main" val="0"/>
+                  </a:ext>
+                </a:extLst>
+              </a:blip>
+              <a:stretch>
+                <a:fillRect/>
+              </a:stretch>
+            </p:blipFill>
+            <p:spPr>
+              <a:xfrm>
+                <a:off x="6559310" y="298129"/>
+                <a:ext cx="2743200" cy="5486400"/>
+              </a:xfrm>
+              <a:prstGeom prst="rect">
+                <a:avLst/>
+              </a:prstGeom>
+            </p:spPr>
+          </p:pic>
+          <p:sp>
+            <p:nvSpPr>
+              <p:cNvPr id="4" name="TextBox 3"/>
+              <p:cNvSpPr txBox="1"/>
+              <p:nvPr/>
+            </p:nvSpPr>
+            <p:spPr>
+              <a:xfrm rot="16200000">
+                <a:off x="3857164" y="2665794"/>
+                <a:ext cx="633594" cy="369332"/>
+              </a:xfrm>
+              <a:prstGeom prst="rect">
+                <a:avLst/>
+              </a:prstGeom>
+              <a:noFill/>
+            </p:spPr>
+            <p:txBody>
+              <a:bodyPr wrap="none" rtlCol="0">
+                <a:spAutoFit/>
+              </a:bodyPr>
+              <a:lstStyle/>
+              <a:p>
+                <a:r>
+                  <a:rPr lang="en-US" dirty="0" smtClean="0">
+                    <a:latin typeface="Times"/>
+                    <a:cs typeface="Times"/>
+                  </a:rPr>
+                  <a:t>Sites</a:t>
+                </a:r>
+                <a:endParaRPr lang="en-US" dirty="0">
+                  <a:latin typeface="Times"/>
+                  <a:cs typeface="Times"/>
+                </a:endParaRPr>
+              </a:p>
+            </p:txBody>
+          </p:sp>
+          <p:sp>
+            <p:nvSpPr>
+              <p:cNvPr id="5" name="TextBox 4"/>
+              <p:cNvSpPr txBox="1"/>
+              <p:nvPr/>
+            </p:nvSpPr>
+            <p:spPr>
+              <a:xfrm rot="16200000">
+                <a:off x="6430639" y="2665794"/>
+                <a:ext cx="633594" cy="369332"/>
+              </a:xfrm>
+              <a:prstGeom prst="rect">
+                <a:avLst/>
+              </a:prstGeom>
+              <a:noFill/>
+            </p:spPr>
+            <p:txBody>
+              <a:bodyPr wrap="none" rtlCol="0">
+                <a:spAutoFit/>
+              </a:bodyPr>
+              <a:lstStyle/>
+              <a:p>
+                <a:r>
+                  <a:rPr lang="en-US" dirty="0" smtClean="0">
+                    <a:latin typeface="Times"/>
+                    <a:cs typeface="Times"/>
+                  </a:rPr>
+                  <a:t>Sites</a:t>
+                </a:r>
+                <a:endParaRPr lang="en-US" dirty="0">
+                  <a:latin typeface="Times"/>
+                  <a:cs typeface="Times"/>
+                </a:endParaRPr>
+              </a:p>
+            </p:txBody>
+          </p:sp>
+          <p:sp>
+            <p:nvSpPr>
+              <p:cNvPr id="6" name="TextBox 5"/>
+              <p:cNvSpPr txBox="1"/>
+              <p:nvPr/>
+            </p:nvSpPr>
+            <p:spPr>
+              <a:xfrm>
+                <a:off x="4930588" y="5415197"/>
+                <a:ext cx="889787" cy="646331"/>
+              </a:xfrm>
+              <a:prstGeom prst="rect">
+                <a:avLst/>
+              </a:prstGeom>
+              <a:noFill/>
+            </p:spPr>
+            <p:txBody>
+              <a:bodyPr wrap="none" rtlCol="0">
+                <a:spAutoFit/>
+              </a:bodyPr>
+              <a:lstStyle/>
+              <a:p>
+                <a:pPr algn="ctr"/>
+                <a:r>
+                  <a:rPr lang="en-US" dirty="0" smtClean="0">
+                    <a:latin typeface="Times"/>
+                    <a:cs typeface="Times"/>
+                  </a:rPr>
+                  <a:t>Species</a:t>
+                </a:r>
+              </a:p>
+              <a:p>
+                <a:pPr algn="ctr"/>
+                <a:r>
+                  <a:rPr lang="en-US" dirty="0" smtClean="0">
+                    <a:latin typeface="Times"/>
+                    <a:cs typeface="Times"/>
+                  </a:rPr>
+                  <a:t>(</a:t>
+                </a:r>
+                <a:r>
+                  <a:rPr lang="en-US" i="1" dirty="0" smtClean="0">
+                    <a:latin typeface="Times"/>
+                    <a:cs typeface="Times"/>
+                  </a:rPr>
+                  <a:t>Z</a:t>
+                </a:r>
+                <a:r>
+                  <a:rPr lang="en-US" dirty="0" smtClean="0">
+                    <a:latin typeface="Times"/>
+                    <a:cs typeface="Times"/>
+                  </a:rPr>
+                  <a:t>)</a:t>
+                </a:r>
+                <a:endParaRPr lang="en-US" dirty="0">
+                  <a:latin typeface="Times"/>
+                  <a:cs typeface="Times"/>
+                </a:endParaRPr>
+              </a:p>
+            </p:txBody>
+          </p:sp>
+          <p:sp>
+            <p:nvSpPr>
+              <p:cNvPr id="7" name="TextBox 6"/>
+              <p:cNvSpPr txBox="1"/>
+              <p:nvPr/>
+            </p:nvSpPr>
+            <p:spPr>
+              <a:xfrm>
+                <a:off x="7499851" y="5415197"/>
+                <a:ext cx="889787" cy="646331"/>
+              </a:xfrm>
+              <a:prstGeom prst="rect">
+                <a:avLst/>
+              </a:prstGeom>
+              <a:noFill/>
+            </p:spPr>
+            <p:txBody>
+              <a:bodyPr wrap="none" rtlCol="0">
+                <a:spAutoFit/>
+              </a:bodyPr>
+              <a:lstStyle/>
+              <a:p>
+                <a:pPr algn="ctr"/>
+                <a:r>
+                  <a:rPr lang="en-US" dirty="0" smtClean="0">
+                    <a:latin typeface="Times"/>
+                    <a:cs typeface="Times"/>
+                  </a:rPr>
+                  <a:t>Species</a:t>
+                </a:r>
+              </a:p>
+              <a:p>
+                <a:pPr algn="ctr"/>
+                <a:r>
+                  <a:rPr lang="en-US" dirty="0" smtClean="0">
+                    <a:latin typeface="Times"/>
+                    <a:cs typeface="Times"/>
+                  </a:rPr>
+                  <a:t>(</a:t>
+                </a:r>
+                <a:r>
+                  <a:rPr lang="en-US" i="1" dirty="0" smtClean="0">
+                    <a:latin typeface="Times"/>
+                    <a:cs typeface="Times"/>
+                  </a:rPr>
+                  <a:t>Y</a:t>
+                </a:r>
+                <a:r>
+                  <a:rPr lang="en-US" dirty="0" smtClean="0">
+                    <a:latin typeface="Times"/>
+                    <a:cs typeface="Times"/>
+                  </a:rPr>
+                  <a:t>)</a:t>
+                </a:r>
+                <a:endParaRPr lang="en-US" dirty="0">
+                  <a:latin typeface="Times"/>
+                  <a:cs typeface="Times"/>
+                </a:endParaRPr>
+              </a:p>
+            </p:txBody>
+          </p:sp>
+          <p:sp>
+            <p:nvSpPr>
+              <p:cNvPr id="8" name="TextBox 7"/>
+              <p:cNvSpPr txBox="1"/>
+              <p:nvPr/>
+            </p:nvSpPr>
+            <p:spPr>
+              <a:xfrm>
+                <a:off x="4433332" y="487670"/>
+                <a:ext cx="440858" cy="369332"/>
+              </a:xfrm>
+              <a:prstGeom prst="rect">
+                <a:avLst/>
+              </a:prstGeom>
+              <a:noFill/>
+            </p:spPr>
+            <p:txBody>
+              <a:bodyPr wrap="none" rtlCol="0">
+                <a:spAutoFit/>
+              </a:bodyPr>
+              <a:lstStyle/>
+              <a:p>
+                <a:r>
+                  <a:rPr lang="en-US" dirty="0" smtClean="0">
+                    <a:latin typeface="Times"/>
+                    <a:cs typeface="Times"/>
+                  </a:rPr>
+                  <a:t>(a)</a:t>
+                </a:r>
+                <a:endParaRPr lang="en-US" dirty="0">
+                  <a:latin typeface="Times"/>
+                  <a:cs typeface="Times"/>
+                </a:endParaRPr>
+              </a:p>
+            </p:txBody>
+          </p:sp>
+          <p:sp>
+            <p:nvSpPr>
+              <p:cNvPr id="9" name="TextBox 8"/>
+              <p:cNvSpPr txBox="1"/>
+              <p:nvPr/>
+            </p:nvSpPr>
+            <p:spPr>
+              <a:xfrm>
+                <a:off x="7021144" y="487670"/>
+                <a:ext cx="453820" cy="369332"/>
+              </a:xfrm>
+              <a:prstGeom prst="rect">
+                <a:avLst/>
+              </a:prstGeom>
+              <a:noFill/>
+            </p:spPr>
+            <p:txBody>
+              <a:bodyPr wrap="none" rtlCol="0">
+                <a:spAutoFit/>
+              </a:bodyPr>
+              <a:lstStyle/>
+              <a:p>
+                <a:r>
+                  <a:rPr lang="en-US" dirty="0" smtClean="0">
+                    <a:latin typeface="Times"/>
+                    <a:cs typeface="Times"/>
+                  </a:rPr>
+                  <a:t>(b)</a:t>
+                </a:r>
+                <a:endParaRPr lang="en-US" dirty="0">
+                  <a:latin typeface="Times"/>
+                  <a:cs typeface="Times"/>
+                </a:endParaRPr>
+              </a:p>
+            </p:txBody>
+          </p:sp>
+        </p:grpSp>
+      </p:grpSp>
+    </p:spTree>
+    <p:extLst>
+      <p:ext uri="{BB962C8B-B14F-4D97-AF65-F5344CB8AC3E}">
+        <p14:creationId xmlns:p14="http://schemas.microsoft.com/office/powerpoint/2010/main" val="126967072"/>
       </p:ext>
     </p:extLst>
   </p:cSld>

</xml_diff>

<commit_message>
updated with species names (legend on the ordinated heat map)
</commit_message>
<xml_diff>
--- a/Tables_Figures/Example1/Example1_Fig.pptx
+++ b/Tables_Figures/Example1/Example1_Fig.pptx
@@ -193,7 +193,7 @@
           <a:p>
             <a:fld id="{54BF691E-C928-604F-BA58-BB42F68C449A}" type="datetimeFigureOut">
               <a:rPr lang="en-US" smtClean="0"/>
-              <a:t>5/9/14</a:t>
+              <a:t>6/24/14</a:t>
             </a:fld>
             <a:endParaRPr lang="en-US"/>
           </a:p>
@@ -726,7 +726,7 @@
           <a:p>
             <a:fld id="{70CA730B-F521-A54B-BECF-B78963336071}" type="datetimeFigureOut">
               <a:rPr lang="en-US" smtClean="0"/>
-              <a:t>5/9/14</a:t>
+              <a:t>6/24/14</a:t>
             </a:fld>
             <a:endParaRPr lang="en-US"/>
           </a:p>
@@ -896,7 +896,7 @@
           <a:p>
             <a:fld id="{70CA730B-F521-A54B-BECF-B78963336071}" type="datetimeFigureOut">
               <a:rPr lang="en-US" smtClean="0"/>
-              <a:t>5/9/14</a:t>
+              <a:t>6/24/14</a:t>
             </a:fld>
             <a:endParaRPr lang="en-US"/>
           </a:p>
@@ -1076,7 +1076,7 @@
           <a:p>
             <a:fld id="{70CA730B-F521-A54B-BECF-B78963336071}" type="datetimeFigureOut">
               <a:rPr lang="en-US" smtClean="0"/>
-              <a:t>5/9/14</a:t>
+              <a:t>6/24/14</a:t>
             </a:fld>
             <a:endParaRPr lang="en-US"/>
           </a:p>
@@ -1246,7 +1246,7 @@
           <a:p>
             <a:fld id="{70CA730B-F521-A54B-BECF-B78963336071}" type="datetimeFigureOut">
               <a:rPr lang="en-US" smtClean="0"/>
-              <a:t>5/9/14</a:t>
+              <a:t>6/24/14</a:t>
             </a:fld>
             <a:endParaRPr lang="en-US"/>
           </a:p>
@@ -1492,7 +1492,7 @@
           <a:p>
             <a:fld id="{70CA730B-F521-A54B-BECF-B78963336071}" type="datetimeFigureOut">
               <a:rPr lang="en-US" smtClean="0"/>
-              <a:t>5/9/14</a:t>
+              <a:t>6/24/14</a:t>
             </a:fld>
             <a:endParaRPr lang="en-US"/>
           </a:p>
@@ -1780,7 +1780,7 @@
           <a:p>
             <a:fld id="{70CA730B-F521-A54B-BECF-B78963336071}" type="datetimeFigureOut">
               <a:rPr lang="en-US" smtClean="0"/>
-              <a:t>5/9/14</a:t>
+              <a:t>6/24/14</a:t>
             </a:fld>
             <a:endParaRPr lang="en-US"/>
           </a:p>
@@ -2202,7 +2202,7 @@
           <a:p>
             <a:fld id="{70CA730B-F521-A54B-BECF-B78963336071}" type="datetimeFigureOut">
               <a:rPr lang="en-US" smtClean="0"/>
-              <a:t>5/9/14</a:t>
+              <a:t>6/24/14</a:t>
             </a:fld>
             <a:endParaRPr lang="en-US"/>
           </a:p>
@@ -2320,7 +2320,7 @@
           <a:p>
             <a:fld id="{70CA730B-F521-A54B-BECF-B78963336071}" type="datetimeFigureOut">
               <a:rPr lang="en-US" smtClean="0"/>
-              <a:t>5/9/14</a:t>
+              <a:t>6/24/14</a:t>
             </a:fld>
             <a:endParaRPr lang="en-US"/>
           </a:p>
@@ -2415,7 +2415,7 @@
           <a:p>
             <a:fld id="{70CA730B-F521-A54B-BECF-B78963336071}" type="datetimeFigureOut">
               <a:rPr lang="en-US" smtClean="0"/>
-              <a:t>5/9/14</a:t>
+              <a:t>6/24/14</a:t>
             </a:fld>
             <a:endParaRPr lang="en-US"/>
           </a:p>
@@ -2692,7 +2692,7 @@
           <a:p>
             <a:fld id="{70CA730B-F521-A54B-BECF-B78963336071}" type="datetimeFigureOut">
               <a:rPr lang="en-US" smtClean="0"/>
-              <a:t>5/9/14</a:t>
+              <a:t>6/24/14</a:t>
             </a:fld>
             <a:endParaRPr lang="en-US"/>
           </a:p>
@@ -2945,7 +2945,7 @@
           <a:p>
             <a:fld id="{70CA730B-F521-A54B-BECF-B78963336071}" type="datetimeFigureOut">
               <a:rPr lang="en-US" smtClean="0"/>
-              <a:t>5/9/14</a:t>
+              <a:t>6/24/14</a:t>
             </a:fld>
             <a:endParaRPr lang="en-US"/>
           </a:p>
@@ -3158,7 +3158,7 @@
           <a:p>
             <a:fld id="{70CA730B-F521-A54B-BECF-B78963336071}" type="datetimeFigureOut">
               <a:rPr lang="en-US" smtClean="0"/>
-              <a:t>5/9/14</a:t>
+              <a:t>6/24/14</a:t>
             </a:fld>
             <a:endParaRPr lang="en-US"/>
           </a:p>
@@ -3535,28 +3535,28 @@
       </p:grpSpPr>
       <p:grpSp>
         <p:nvGrpSpPr>
-          <p:cNvPr id="32" name="Group 31"/>
+          <p:cNvPr id="11" name="Group 10"/>
           <p:cNvGrpSpPr/>
           <p:nvPr/>
         </p:nvGrpSpPr>
         <p:grpSpPr>
           <a:xfrm>
-            <a:off x="911412" y="134471"/>
-            <a:ext cx="11579412" cy="5752353"/>
-            <a:chOff x="911412" y="134471"/>
-            <a:chExt cx="11579412" cy="5752353"/>
+            <a:off x="915631" y="132914"/>
+            <a:ext cx="12036113" cy="5730076"/>
+            <a:chOff x="915631" y="132914"/>
+            <a:chExt cx="12036113" cy="5730076"/>
           </a:xfrm>
         </p:grpSpPr>
         <p:sp>
           <p:nvSpPr>
-            <p:cNvPr id="31" name="Rectangle 30"/>
+            <p:cNvPr id="9" name="Rectangle 8"/>
             <p:cNvSpPr/>
             <p:nvPr/>
           </p:nvSpPr>
           <p:spPr>
             <a:xfrm>
-              <a:off x="911412" y="134471"/>
-              <a:ext cx="11579412" cy="5752353"/>
+              <a:off x="915631" y="132914"/>
+              <a:ext cx="12036113" cy="5730076"/>
             </a:xfrm>
             <a:prstGeom prst="rect">
               <a:avLst/>
@@ -3594,21 +3594,21 @@
         </p:sp>
         <p:grpSp>
           <p:nvGrpSpPr>
-            <p:cNvPr id="30" name="Group 29"/>
+            <p:cNvPr id="3" name="Group 2"/>
             <p:cNvGrpSpPr/>
             <p:nvPr/>
           </p:nvGrpSpPr>
           <p:grpSpPr>
             <a:xfrm>
-              <a:off x="1049476" y="272939"/>
-              <a:ext cx="11324720" cy="5486400"/>
-              <a:chOff x="1049476" y="108588"/>
-              <a:chExt cx="11324720" cy="5486400"/>
+              <a:off x="1049475" y="272939"/>
+              <a:ext cx="11752993" cy="5486400"/>
+              <a:chOff x="1049475" y="272939"/>
+              <a:chExt cx="11752993" cy="5486400"/>
             </a:xfrm>
           </p:grpSpPr>
           <p:pic>
             <p:nvPicPr>
-              <p:cNvPr id="27" name="Picture 26" descr="Zpost_ord.pdf"/>
+              <p:cNvPr id="2" name="Picture 1" descr="Zpost_ord_wlegend.pdf"/>
               <p:cNvPicPr>
                 <a:picLocks noChangeAspect="1"/>
               </p:cNvPicPr>
@@ -3628,8 +3628,8 @@
             </p:blipFill>
             <p:spPr>
               <a:xfrm>
-                <a:off x="1049476" y="108588"/>
-                <a:ext cx="2743200" cy="5486400"/>
+                <a:off x="1049475" y="272939"/>
+                <a:ext cx="3657600" cy="5486400"/>
               </a:xfrm>
               <a:prstGeom prst="rect">
                 <a:avLst/>
@@ -3644,7 +3644,7 @@
             </p:nvSpPr>
             <p:spPr>
               <a:xfrm rot="16200000">
-                <a:off x="917345" y="2476253"/>
+                <a:off x="917345" y="2640604"/>
                 <a:ext cx="633594" cy="369332"/>
               </a:xfrm>
               <a:prstGeom prst="rect">
@@ -3680,7 +3680,7 @@
             </p:nvSpPr>
             <p:spPr>
               <a:xfrm>
-                <a:off x="1986557" y="5225656"/>
+                <a:off x="1986557" y="5390007"/>
                 <a:ext cx="889787" cy="369332"/>
               </a:xfrm>
               <a:prstGeom prst="rect">
@@ -3702,10 +3702,6 @@
                   </a:rPr>
                   <a:t>Species</a:t>
                 </a:r>
-                <a:endParaRPr lang="en-US" dirty="0" smtClean="0">
-                  <a:latin typeface="Times"/>
-                  <a:cs typeface="Times"/>
-                </a:endParaRPr>
               </a:p>
             </p:txBody>
           </p:sp>
@@ -3717,7 +3713,7 @@
             </p:nvSpPr>
             <p:spPr>
               <a:xfrm>
-                <a:off x="1507850" y="178601"/>
+                <a:off x="1507850" y="342952"/>
                 <a:ext cx="440858" cy="369332"/>
               </a:xfrm>
               <a:prstGeom prst="rect">
@@ -3753,7 +3749,7 @@
             </p:nvGrpSpPr>
             <p:grpSpPr>
               <a:xfrm>
-                <a:off x="3887327" y="108588"/>
+                <a:off x="4315599" y="272939"/>
                 <a:ext cx="8486869" cy="3024934"/>
                 <a:chOff x="5411327" y="108588"/>
                 <a:chExt cx="8486869" cy="3024934"/>
@@ -4117,7 +4113,7 @@
             </p:nvGrpSpPr>
             <p:grpSpPr>
               <a:xfrm>
-                <a:off x="4571774" y="3343922"/>
+                <a:off x="5000046" y="3508273"/>
                 <a:ext cx="7249150" cy="2027849"/>
                 <a:chOff x="6228099" y="3851779"/>
                 <a:chExt cx="7249150" cy="2027849"/>
@@ -4288,28 +4284,28 @@
       </p:grpSpPr>
       <p:grpSp>
         <p:nvGrpSpPr>
-          <p:cNvPr id="12" name="Group 11"/>
+          <p:cNvPr id="18" name="Group 17"/>
           <p:cNvGrpSpPr/>
           <p:nvPr/>
         </p:nvGrpSpPr>
         <p:grpSpPr>
           <a:xfrm>
-            <a:off x="3839882" y="149412"/>
-            <a:ext cx="5602942" cy="6036235"/>
-            <a:chOff x="3839882" y="149412"/>
-            <a:chExt cx="5602942" cy="6036235"/>
+            <a:off x="3854510" y="162451"/>
+            <a:ext cx="5552857" cy="6069745"/>
+            <a:chOff x="3854510" y="162451"/>
+            <a:chExt cx="5552857" cy="6069745"/>
           </a:xfrm>
         </p:grpSpPr>
         <p:sp>
           <p:nvSpPr>
-            <p:cNvPr id="11" name="Rectangle 10"/>
+            <p:cNvPr id="17" name="Rectangle 16"/>
             <p:cNvSpPr/>
             <p:nvPr/>
           </p:nvSpPr>
           <p:spPr>
             <a:xfrm>
-              <a:off x="3839882" y="149412"/>
-              <a:ext cx="5602942" cy="6036235"/>
+              <a:off x="3854510" y="162451"/>
+              <a:ext cx="5552857" cy="6069745"/>
             </a:xfrm>
             <a:prstGeom prst="rect">
               <a:avLst/>
@@ -4347,21 +4343,21 @@
         </p:sp>
         <p:grpSp>
           <p:nvGrpSpPr>
-            <p:cNvPr id="10" name="Group 9"/>
+            <p:cNvPr id="16" name="Group 15"/>
             <p:cNvGrpSpPr/>
             <p:nvPr/>
           </p:nvGrpSpPr>
           <p:grpSpPr>
             <a:xfrm>
-              <a:off x="3989294" y="298129"/>
-              <a:ext cx="5313216" cy="5763399"/>
-              <a:chOff x="3989294" y="298129"/>
-              <a:chExt cx="5313216" cy="5763399"/>
+              <a:off x="3989295" y="298129"/>
+              <a:ext cx="5301907" cy="5809565"/>
+              <a:chOff x="3989295" y="298129"/>
+              <a:chExt cx="5301907" cy="5809565"/>
             </a:xfrm>
           </p:grpSpPr>
           <p:pic>
             <p:nvPicPr>
-              <p:cNvPr id="2" name="Picture 1" descr="Zmat_ord.pdf"/>
+              <p:cNvPr id="15" name="Picture 14" descr="Ymat_ord.pdf"/>
               <p:cNvPicPr>
                 <a:picLocks noChangeAspect="1"/>
               </p:cNvPicPr>
@@ -4381,7 +4377,7 @@
             </p:blipFill>
             <p:spPr>
               <a:xfrm>
-                <a:off x="3989294" y="298129"/>
+                <a:off x="6548002" y="298129"/>
                 <a:ext cx="2743200" cy="5486400"/>
               </a:xfrm>
               <a:prstGeom prst="rect">
@@ -4391,7 +4387,7 @@
           </p:pic>
           <p:pic>
             <p:nvPicPr>
-              <p:cNvPr id="3" name="Picture 2" descr="Ymat_ord.pdf"/>
+              <p:cNvPr id="14" name="Picture 13" descr="Zmat_ord.pdf"/>
               <p:cNvPicPr>
                 <a:picLocks noChangeAspect="1"/>
               </p:cNvPicPr>
@@ -4411,7 +4407,7 @@
             </p:blipFill>
             <p:spPr>
               <a:xfrm>
-                <a:off x="6559310" y="298129"/>
+                <a:off x="3989295" y="298129"/>
                 <a:ext cx="2743200" cy="5486400"/>
               </a:xfrm>
               <a:prstGeom prst="rect">
@@ -4499,7 +4495,7 @@
             </p:nvSpPr>
             <p:spPr>
               <a:xfrm>
-                <a:off x="4930588" y="5415197"/>
+                <a:off x="4930588" y="5461363"/>
                 <a:ext cx="889787" cy="646331"/>
               </a:xfrm>
               <a:prstGeom prst="rect">
@@ -4560,7 +4556,7 @@
             </p:nvSpPr>
             <p:spPr>
               <a:xfrm>
-                <a:off x="7499851" y="5415197"/>
+                <a:off x="7485083" y="5461363"/>
                 <a:ext cx="889787" cy="646331"/>
               </a:xfrm>
               <a:prstGeom prst="rect">

</xml_diff>